<commit_message>
Update project04 - 기능 정의 - 형준.pptx
</commit_message>
<xml_diff>
--- a/1 기능 정의/project04 - 기능 정의 - 형준.pptx
+++ b/1 기능 정의/project04 - 기능 정의 - 형준.pptx
@@ -109,7 +109,7 @@
   </p:defaultTextStyle>
   <p:extLst>
     <p:ext uri="{EFAFB233-063F-42B5-8137-9DF3F51BA10A}">
-      <p15:sldGuideLst xmlns:p15="http://schemas.microsoft.com/office/powerpoint/2012/main" xmlns="">
+      <p15:sldGuideLst xmlns:p15="http://schemas.microsoft.com/office/powerpoint/2012/main">
         <p15:guide id="1" orient="horz" pos="2160">
           <p15:clr>
             <a:srgbClr val="A4A3A4"/>
@@ -168,10 +168,9 @@
           </a:lstStyle>
           <a:p>
             <a:r>
-              <a:rPr lang="ko-KR" altLang="en-US" smtClean="0"/>
+              <a:rPr lang="ko-KR" altLang="en-US"/>
               <a:t>마스터 제목 스타일 편집</a:t>
             </a:r>
-            <a:endParaRPr lang="ko-KR" altLang="en-US"/>
           </a:p>
         </p:txBody>
       </p:sp>
@@ -233,10 +232,9 @@
           </a:lstStyle>
           <a:p>
             <a:r>
-              <a:rPr lang="ko-KR" altLang="en-US" smtClean="0"/>
+              <a:rPr lang="ko-KR" altLang="en-US"/>
               <a:t>마스터 부제목 스타일 편집</a:t>
             </a:r>
-            <a:endParaRPr lang="ko-KR" altLang="en-US"/>
           </a:p>
         </p:txBody>
       </p:sp>
@@ -258,7 +256,7 @@
             <a:fld id="{E0C64F5E-737F-4F6B-9F15-DAA8DB3BF429}" type="datetimeFigureOut">
               <a:rPr lang="ko-KR" altLang="en-US" smtClean="0"/>
               <a:pPr/>
-              <a:t>2020-02-28</a:t>
+              <a:t>2020-02-29</a:t>
             </a:fld>
             <a:endParaRPr lang="ko-KR" altLang="en-US"/>
           </a:p>
@@ -353,10 +351,9 @@
           <a:lstStyle/>
           <a:p>
             <a:r>
-              <a:rPr lang="ko-KR" altLang="en-US" smtClean="0"/>
+              <a:rPr lang="ko-KR" altLang="en-US"/>
               <a:t>마스터 제목 스타일 편집</a:t>
             </a:r>
-            <a:endParaRPr lang="ko-KR" altLang="en-US"/>
           </a:p>
         </p:txBody>
       </p:sp>
@@ -377,38 +374,37 @@
           <a:p>
             <a:pPr lvl="0"/>
             <a:r>
-              <a:rPr lang="ko-KR" altLang="en-US" smtClean="0"/>
+              <a:rPr lang="ko-KR" altLang="en-US"/>
               <a:t>마스터 텍스트 스타일을 편집합니다</a:t>
             </a:r>
           </a:p>
           <a:p>
             <a:pPr lvl="1"/>
             <a:r>
-              <a:rPr lang="ko-KR" altLang="en-US" smtClean="0"/>
+              <a:rPr lang="ko-KR" altLang="en-US"/>
               <a:t>둘째 수준</a:t>
             </a:r>
           </a:p>
           <a:p>
             <a:pPr lvl="2"/>
             <a:r>
-              <a:rPr lang="ko-KR" altLang="en-US" smtClean="0"/>
+              <a:rPr lang="ko-KR" altLang="en-US"/>
               <a:t>셋째 수준</a:t>
             </a:r>
           </a:p>
           <a:p>
             <a:pPr lvl="3"/>
             <a:r>
-              <a:rPr lang="ko-KR" altLang="en-US" smtClean="0"/>
+              <a:rPr lang="ko-KR" altLang="en-US"/>
               <a:t>넷째 수준</a:t>
             </a:r>
           </a:p>
           <a:p>
             <a:pPr lvl="4"/>
             <a:r>
-              <a:rPr lang="ko-KR" altLang="en-US" smtClean="0"/>
+              <a:rPr lang="ko-KR" altLang="en-US"/>
               <a:t>다섯째 수준</a:t>
             </a:r>
-            <a:endParaRPr lang="ko-KR" altLang="en-US"/>
           </a:p>
         </p:txBody>
       </p:sp>
@@ -430,7 +426,7 @@
             <a:fld id="{E0C64F5E-737F-4F6B-9F15-DAA8DB3BF429}" type="datetimeFigureOut">
               <a:rPr lang="ko-KR" altLang="en-US" smtClean="0"/>
               <a:pPr/>
-              <a:t>2020-02-28</a:t>
+              <a:t>2020-02-29</a:t>
             </a:fld>
             <a:endParaRPr lang="ko-KR" altLang="en-US"/>
           </a:p>
@@ -530,10 +526,9 @@
           <a:lstStyle/>
           <a:p>
             <a:r>
-              <a:rPr lang="ko-KR" altLang="en-US" smtClean="0"/>
+              <a:rPr lang="ko-KR" altLang="en-US"/>
               <a:t>마스터 제목 스타일 편집</a:t>
             </a:r>
-            <a:endParaRPr lang="ko-KR" altLang="en-US"/>
           </a:p>
         </p:txBody>
       </p:sp>
@@ -559,38 +554,37 @@
           <a:p>
             <a:pPr lvl="0"/>
             <a:r>
-              <a:rPr lang="ko-KR" altLang="en-US" smtClean="0"/>
+              <a:rPr lang="ko-KR" altLang="en-US"/>
               <a:t>마스터 텍스트 스타일을 편집합니다</a:t>
             </a:r>
           </a:p>
           <a:p>
             <a:pPr lvl="1"/>
             <a:r>
-              <a:rPr lang="ko-KR" altLang="en-US" smtClean="0"/>
+              <a:rPr lang="ko-KR" altLang="en-US"/>
               <a:t>둘째 수준</a:t>
             </a:r>
           </a:p>
           <a:p>
             <a:pPr lvl="2"/>
             <a:r>
-              <a:rPr lang="ko-KR" altLang="en-US" smtClean="0"/>
+              <a:rPr lang="ko-KR" altLang="en-US"/>
               <a:t>셋째 수준</a:t>
             </a:r>
           </a:p>
           <a:p>
             <a:pPr lvl="3"/>
             <a:r>
-              <a:rPr lang="ko-KR" altLang="en-US" smtClean="0"/>
+              <a:rPr lang="ko-KR" altLang="en-US"/>
               <a:t>넷째 수준</a:t>
             </a:r>
           </a:p>
           <a:p>
             <a:pPr lvl="4"/>
             <a:r>
-              <a:rPr lang="ko-KR" altLang="en-US" smtClean="0"/>
+              <a:rPr lang="ko-KR" altLang="en-US"/>
               <a:t>다섯째 수준</a:t>
             </a:r>
-            <a:endParaRPr lang="ko-KR" altLang="en-US"/>
           </a:p>
         </p:txBody>
       </p:sp>
@@ -612,7 +606,7 @@
             <a:fld id="{E0C64F5E-737F-4F6B-9F15-DAA8DB3BF429}" type="datetimeFigureOut">
               <a:rPr lang="ko-KR" altLang="en-US" smtClean="0"/>
               <a:pPr/>
-              <a:t>2020-02-28</a:t>
+              <a:t>2020-02-29</a:t>
             </a:fld>
             <a:endParaRPr lang="ko-KR" altLang="en-US"/>
           </a:p>
@@ -707,10 +701,9 @@
           <a:lstStyle/>
           <a:p>
             <a:r>
-              <a:rPr lang="ko-KR" altLang="en-US" smtClean="0"/>
+              <a:rPr lang="ko-KR" altLang="en-US"/>
               <a:t>마스터 제목 스타일 편집</a:t>
             </a:r>
-            <a:endParaRPr lang="ko-KR" altLang="en-US"/>
           </a:p>
         </p:txBody>
       </p:sp>
@@ -731,38 +724,37 @@
           <a:p>
             <a:pPr lvl="0"/>
             <a:r>
-              <a:rPr lang="ko-KR" altLang="en-US" smtClean="0"/>
+              <a:rPr lang="ko-KR" altLang="en-US"/>
               <a:t>마스터 텍스트 스타일을 편집합니다</a:t>
             </a:r>
           </a:p>
           <a:p>
             <a:pPr lvl="1"/>
             <a:r>
-              <a:rPr lang="ko-KR" altLang="en-US" smtClean="0"/>
+              <a:rPr lang="ko-KR" altLang="en-US"/>
               <a:t>둘째 수준</a:t>
             </a:r>
           </a:p>
           <a:p>
             <a:pPr lvl="2"/>
             <a:r>
-              <a:rPr lang="ko-KR" altLang="en-US" smtClean="0"/>
+              <a:rPr lang="ko-KR" altLang="en-US"/>
               <a:t>셋째 수준</a:t>
             </a:r>
           </a:p>
           <a:p>
             <a:pPr lvl="3"/>
             <a:r>
-              <a:rPr lang="ko-KR" altLang="en-US" smtClean="0"/>
+              <a:rPr lang="ko-KR" altLang="en-US"/>
               <a:t>넷째 수준</a:t>
             </a:r>
           </a:p>
           <a:p>
             <a:pPr lvl="4"/>
             <a:r>
-              <a:rPr lang="ko-KR" altLang="en-US" smtClean="0"/>
+              <a:rPr lang="ko-KR" altLang="en-US"/>
               <a:t>다섯째 수준</a:t>
             </a:r>
-            <a:endParaRPr lang="ko-KR" altLang="en-US"/>
           </a:p>
         </p:txBody>
       </p:sp>
@@ -784,7 +776,7 @@
             <a:fld id="{E0C64F5E-737F-4F6B-9F15-DAA8DB3BF429}" type="datetimeFigureOut">
               <a:rPr lang="ko-KR" altLang="en-US" smtClean="0"/>
               <a:pPr/>
-              <a:t>2020-02-28</a:t>
+              <a:t>2020-02-29</a:t>
             </a:fld>
             <a:endParaRPr lang="ko-KR" altLang="en-US"/>
           </a:p>
@@ -888,10 +880,9 @@
           </a:lstStyle>
           <a:p>
             <a:r>
-              <a:rPr lang="ko-KR" altLang="en-US" smtClean="0"/>
+              <a:rPr lang="ko-KR" altLang="en-US"/>
               <a:t>마스터 제목 스타일 편집</a:t>
             </a:r>
-            <a:endParaRPr lang="ko-KR" altLang="en-US"/>
           </a:p>
         </p:txBody>
       </p:sp>
@@ -1008,7 +999,7 @@
           <a:p>
             <a:pPr lvl="0"/>
             <a:r>
-              <a:rPr lang="ko-KR" altLang="en-US" smtClean="0"/>
+              <a:rPr lang="ko-KR" altLang="en-US"/>
               <a:t>마스터 텍스트 스타일을 편집합니다</a:t>
             </a:r>
           </a:p>
@@ -1032,7 +1023,7 @@
             <a:fld id="{E0C64F5E-737F-4F6B-9F15-DAA8DB3BF429}" type="datetimeFigureOut">
               <a:rPr lang="ko-KR" altLang="en-US" smtClean="0"/>
               <a:pPr/>
-              <a:t>2020-02-28</a:t>
+              <a:t>2020-02-29</a:t>
             </a:fld>
             <a:endParaRPr lang="ko-KR" altLang="en-US"/>
           </a:p>
@@ -1127,10 +1118,9 @@
           <a:lstStyle/>
           <a:p>
             <a:r>
-              <a:rPr lang="ko-KR" altLang="en-US" smtClean="0"/>
+              <a:rPr lang="ko-KR" altLang="en-US"/>
               <a:t>마스터 제목 스타일 편집</a:t>
             </a:r>
-            <a:endParaRPr lang="ko-KR" altLang="en-US"/>
           </a:p>
         </p:txBody>
       </p:sp>
@@ -1156,38 +1146,37 @@
           <a:p>
             <a:pPr lvl="0"/>
             <a:r>
-              <a:rPr lang="ko-KR" altLang="en-US" smtClean="0"/>
+              <a:rPr lang="ko-KR" altLang="en-US"/>
               <a:t>마스터 텍스트 스타일을 편집합니다</a:t>
             </a:r>
           </a:p>
           <a:p>
             <a:pPr lvl="1"/>
             <a:r>
-              <a:rPr lang="ko-KR" altLang="en-US" smtClean="0"/>
+              <a:rPr lang="ko-KR" altLang="en-US"/>
               <a:t>둘째 수준</a:t>
             </a:r>
           </a:p>
           <a:p>
             <a:pPr lvl="2"/>
             <a:r>
-              <a:rPr lang="ko-KR" altLang="en-US" smtClean="0"/>
+              <a:rPr lang="ko-KR" altLang="en-US"/>
               <a:t>셋째 수준</a:t>
             </a:r>
           </a:p>
           <a:p>
             <a:pPr lvl="3"/>
             <a:r>
-              <a:rPr lang="ko-KR" altLang="en-US" smtClean="0"/>
+              <a:rPr lang="ko-KR" altLang="en-US"/>
               <a:t>넷째 수준</a:t>
             </a:r>
           </a:p>
           <a:p>
             <a:pPr lvl="4"/>
             <a:r>
-              <a:rPr lang="ko-KR" altLang="en-US" smtClean="0"/>
+              <a:rPr lang="ko-KR" altLang="en-US"/>
               <a:t>다섯째 수준</a:t>
             </a:r>
-            <a:endParaRPr lang="ko-KR" altLang="en-US"/>
           </a:p>
         </p:txBody>
       </p:sp>
@@ -1213,38 +1202,37 @@
           <a:p>
             <a:pPr lvl="0"/>
             <a:r>
-              <a:rPr lang="ko-KR" altLang="en-US" smtClean="0"/>
+              <a:rPr lang="ko-KR" altLang="en-US"/>
               <a:t>마스터 텍스트 스타일을 편집합니다</a:t>
             </a:r>
           </a:p>
           <a:p>
             <a:pPr lvl="1"/>
             <a:r>
-              <a:rPr lang="ko-KR" altLang="en-US" smtClean="0"/>
+              <a:rPr lang="ko-KR" altLang="en-US"/>
               <a:t>둘째 수준</a:t>
             </a:r>
           </a:p>
           <a:p>
             <a:pPr lvl="2"/>
             <a:r>
-              <a:rPr lang="ko-KR" altLang="en-US" smtClean="0"/>
+              <a:rPr lang="ko-KR" altLang="en-US"/>
               <a:t>셋째 수준</a:t>
             </a:r>
           </a:p>
           <a:p>
             <a:pPr lvl="3"/>
             <a:r>
-              <a:rPr lang="ko-KR" altLang="en-US" smtClean="0"/>
+              <a:rPr lang="ko-KR" altLang="en-US"/>
               <a:t>넷째 수준</a:t>
             </a:r>
           </a:p>
           <a:p>
             <a:pPr lvl="4"/>
             <a:r>
-              <a:rPr lang="ko-KR" altLang="en-US" smtClean="0"/>
+              <a:rPr lang="ko-KR" altLang="en-US"/>
               <a:t>다섯째 수준</a:t>
             </a:r>
-            <a:endParaRPr lang="ko-KR" altLang="en-US"/>
           </a:p>
         </p:txBody>
       </p:sp>
@@ -1266,7 +1254,7 @@
             <a:fld id="{E0C64F5E-737F-4F6B-9F15-DAA8DB3BF429}" type="datetimeFigureOut">
               <a:rPr lang="ko-KR" altLang="en-US" smtClean="0"/>
               <a:pPr/>
-              <a:t>2020-02-28</a:t>
+              <a:t>2020-02-29</a:t>
             </a:fld>
             <a:endParaRPr lang="ko-KR" altLang="en-US"/>
           </a:p>
@@ -1366,10 +1354,9 @@
           <a:lstStyle/>
           <a:p>
             <a:r>
-              <a:rPr lang="ko-KR" altLang="en-US" smtClean="0"/>
+              <a:rPr lang="ko-KR" altLang="en-US"/>
               <a:t>마스터 제목 스타일 편집</a:t>
             </a:r>
-            <a:endParaRPr lang="ko-KR" altLang="en-US"/>
           </a:p>
         </p:txBody>
       </p:sp>
@@ -1432,7 +1419,7 @@
           <a:p>
             <a:pPr lvl="0"/>
             <a:r>
-              <a:rPr lang="ko-KR" altLang="en-US" smtClean="0"/>
+              <a:rPr lang="ko-KR" altLang="en-US"/>
               <a:t>마스터 텍스트 스타일을 편집합니다</a:t>
             </a:r>
           </a:p>
@@ -1460,38 +1447,37 @@
           <a:p>
             <a:pPr lvl="0"/>
             <a:r>
-              <a:rPr lang="ko-KR" altLang="en-US" smtClean="0"/>
+              <a:rPr lang="ko-KR" altLang="en-US"/>
               <a:t>마스터 텍스트 스타일을 편집합니다</a:t>
             </a:r>
           </a:p>
           <a:p>
             <a:pPr lvl="1"/>
             <a:r>
-              <a:rPr lang="ko-KR" altLang="en-US" smtClean="0"/>
+              <a:rPr lang="ko-KR" altLang="en-US"/>
               <a:t>둘째 수준</a:t>
             </a:r>
           </a:p>
           <a:p>
             <a:pPr lvl="2"/>
             <a:r>
-              <a:rPr lang="ko-KR" altLang="en-US" smtClean="0"/>
+              <a:rPr lang="ko-KR" altLang="en-US"/>
               <a:t>셋째 수준</a:t>
             </a:r>
           </a:p>
           <a:p>
             <a:pPr lvl="3"/>
             <a:r>
-              <a:rPr lang="ko-KR" altLang="en-US" smtClean="0"/>
+              <a:rPr lang="ko-KR" altLang="en-US"/>
               <a:t>넷째 수준</a:t>
             </a:r>
           </a:p>
           <a:p>
             <a:pPr lvl="4"/>
             <a:r>
-              <a:rPr lang="ko-KR" altLang="en-US" smtClean="0"/>
+              <a:rPr lang="ko-KR" altLang="en-US"/>
               <a:t>다섯째 수준</a:t>
             </a:r>
-            <a:endParaRPr lang="ko-KR" altLang="en-US"/>
           </a:p>
         </p:txBody>
       </p:sp>
@@ -1554,7 +1540,7 @@
           <a:p>
             <a:pPr lvl="0"/>
             <a:r>
-              <a:rPr lang="ko-KR" altLang="en-US" smtClean="0"/>
+              <a:rPr lang="ko-KR" altLang="en-US"/>
               <a:t>마스터 텍스트 스타일을 편집합니다</a:t>
             </a:r>
           </a:p>
@@ -1582,38 +1568,37 @@
           <a:p>
             <a:pPr lvl="0"/>
             <a:r>
-              <a:rPr lang="ko-KR" altLang="en-US" smtClean="0"/>
+              <a:rPr lang="ko-KR" altLang="en-US"/>
               <a:t>마스터 텍스트 스타일을 편집합니다</a:t>
             </a:r>
           </a:p>
           <a:p>
             <a:pPr lvl="1"/>
             <a:r>
-              <a:rPr lang="ko-KR" altLang="en-US" smtClean="0"/>
+              <a:rPr lang="ko-KR" altLang="en-US"/>
               <a:t>둘째 수준</a:t>
             </a:r>
           </a:p>
           <a:p>
             <a:pPr lvl="2"/>
             <a:r>
-              <a:rPr lang="ko-KR" altLang="en-US" smtClean="0"/>
+              <a:rPr lang="ko-KR" altLang="en-US"/>
               <a:t>셋째 수준</a:t>
             </a:r>
           </a:p>
           <a:p>
             <a:pPr lvl="3"/>
             <a:r>
-              <a:rPr lang="ko-KR" altLang="en-US" smtClean="0"/>
+              <a:rPr lang="ko-KR" altLang="en-US"/>
               <a:t>넷째 수준</a:t>
             </a:r>
           </a:p>
           <a:p>
             <a:pPr lvl="4"/>
             <a:r>
-              <a:rPr lang="ko-KR" altLang="en-US" smtClean="0"/>
+              <a:rPr lang="ko-KR" altLang="en-US"/>
               <a:t>다섯째 수준</a:t>
             </a:r>
-            <a:endParaRPr lang="ko-KR" altLang="en-US"/>
           </a:p>
         </p:txBody>
       </p:sp>
@@ -1635,7 +1620,7 @@
             <a:fld id="{E0C64F5E-737F-4F6B-9F15-DAA8DB3BF429}" type="datetimeFigureOut">
               <a:rPr lang="ko-KR" altLang="en-US" smtClean="0"/>
               <a:pPr/>
-              <a:t>2020-02-28</a:t>
+              <a:t>2020-02-29</a:t>
             </a:fld>
             <a:endParaRPr lang="ko-KR" altLang="en-US"/>
           </a:p>
@@ -1730,10 +1715,9 @@
           <a:lstStyle/>
           <a:p>
             <a:r>
-              <a:rPr lang="ko-KR" altLang="en-US" smtClean="0"/>
+              <a:rPr lang="ko-KR" altLang="en-US"/>
               <a:t>마스터 제목 스타일 편집</a:t>
             </a:r>
-            <a:endParaRPr lang="ko-KR" altLang="en-US"/>
           </a:p>
         </p:txBody>
       </p:sp>
@@ -1755,7 +1739,7 @@
             <a:fld id="{E0C64F5E-737F-4F6B-9F15-DAA8DB3BF429}" type="datetimeFigureOut">
               <a:rPr lang="ko-KR" altLang="en-US" smtClean="0"/>
               <a:pPr/>
-              <a:t>2020-02-28</a:t>
+              <a:t>2020-02-29</a:t>
             </a:fld>
             <a:endParaRPr lang="ko-KR" altLang="en-US"/>
           </a:p>
@@ -1852,7 +1836,7 @@
             <a:fld id="{E0C64F5E-737F-4F6B-9F15-DAA8DB3BF429}" type="datetimeFigureOut">
               <a:rPr lang="ko-KR" altLang="en-US" smtClean="0"/>
               <a:pPr/>
-              <a:t>2020-02-28</a:t>
+              <a:t>2020-02-29</a:t>
             </a:fld>
             <a:endParaRPr lang="ko-KR" altLang="en-US"/>
           </a:p>
@@ -1956,10 +1940,9 @@
           </a:lstStyle>
           <a:p>
             <a:r>
-              <a:rPr lang="ko-KR" altLang="en-US" smtClean="0"/>
+              <a:rPr lang="ko-KR" altLang="en-US"/>
               <a:t>마스터 제목 스타일 편집</a:t>
             </a:r>
-            <a:endParaRPr lang="ko-KR" altLang="en-US"/>
           </a:p>
         </p:txBody>
       </p:sp>
@@ -2013,38 +1996,37 @@
           <a:p>
             <a:pPr lvl="0"/>
             <a:r>
-              <a:rPr lang="ko-KR" altLang="en-US" smtClean="0"/>
+              <a:rPr lang="ko-KR" altLang="en-US"/>
               <a:t>마스터 텍스트 스타일을 편집합니다</a:t>
             </a:r>
           </a:p>
           <a:p>
             <a:pPr lvl="1"/>
             <a:r>
-              <a:rPr lang="ko-KR" altLang="en-US" smtClean="0"/>
+              <a:rPr lang="ko-KR" altLang="en-US"/>
               <a:t>둘째 수준</a:t>
             </a:r>
           </a:p>
           <a:p>
             <a:pPr lvl="2"/>
             <a:r>
-              <a:rPr lang="ko-KR" altLang="en-US" smtClean="0"/>
+              <a:rPr lang="ko-KR" altLang="en-US"/>
               <a:t>셋째 수준</a:t>
             </a:r>
           </a:p>
           <a:p>
             <a:pPr lvl="3"/>
             <a:r>
-              <a:rPr lang="ko-KR" altLang="en-US" smtClean="0"/>
+              <a:rPr lang="ko-KR" altLang="en-US"/>
               <a:t>넷째 수준</a:t>
             </a:r>
           </a:p>
           <a:p>
             <a:pPr lvl="4"/>
             <a:r>
-              <a:rPr lang="ko-KR" altLang="en-US" smtClean="0"/>
+              <a:rPr lang="ko-KR" altLang="en-US"/>
               <a:t>다섯째 수준</a:t>
             </a:r>
-            <a:endParaRPr lang="ko-KR" altLang="en-US"/>
           </a:p>
         </p:txBody>
       </p:sp>
@@ -2107,7 +2089,7 @@
           <a:p>
             <a:pPr lvl="0"/>
             <a:r>
-              <a:rPr lang="ko-KR" altLang="en-US" smtClean="0"/>
+              <a:rPr lang="ko-KR" altLang="en-US"/>
               <a:t>마스터 텍스트 스타일을 편집합니다</a:t>
             </a:r>
           </a:p>
@@ -2131,7 +2113,7 @@
             <a:fld id="{E0C64F5E-737F-4F6B-9F15-DAA8DB3BF429}" type="datetimeFigureOut">
               <a:rPr lang="ko-KR" altLang="en-US" smtClean="0"/>
               <a:pPr/>
-              <a:t>2020-02-28</a:t>
+              <a:t>2020-02-29</a:t>
             </a:fld>
             <a:endParaRPr lang="ko-KR" altLang="en-US"/>
           </a:p>
@@ -2235,10 +2217,9 @@
           </a:lstStyle>
           <a:p>
             <a:r>
-              <a:rPr lang="ko-KR" altLang="en-US" smtClean="0"/>
+              <a:rPr lang="ko-KR" altLang="en-US"/>
               <a:t>마스터 제목 스타일 편집</a:t>
             </a:r>
-            <a:endParaRPr lang="ko-KR" altLang="en-US"/>
           </a:p>
         </p:txBody>
       </p:sp>
@@ -2362,7 +2343,7 @@
           <a:p>
             <a:pPr lvl="0"/>
             <a:r>
-              <a:rPr lang="ko-KR" altLang="en-US" smtClean="0"/>
+              <a:rPr lang="ko-KR" altLang="en-US"/>
               <a:t>마스터 텍스트 스타일을 편집합니다</a:t>
             </a:r>
           </a:p>
@@ -2386,7 +2367,7 @@
             <a:fld id="{E0C64F5E-737F-4F6B-9F15-DAA8DB3BF429}" type="datetimeFigureOut">
               <a:rPr lang="ko-KR" altLang="en-US" smtClean="0"/>
               <a:pPr/>
-              <a:t>2020-02-28</a:t>
+              <a:t>2020-02-29</a:t>
             </a:fld>
             <a:endParaRPr lang="ko-KR" altLang="en-US"/>
           </a:p>
@@ -2496,10 +2477,9 @@
           <a:lstStyle/>
           <a:p>
             <a:r>
-              <a:rPr lang="ko-KR" altLang="en-US" smtClean="0"/>
+              <a:rPr lang="ko-KR" altLang="en-US"/>
               <a:t>마스터 제목 스타일 편집</a:t>
             </a:r>
-            <a:endParaRPr lang="ko-KR" altLang="en-US"/>
           </a:p>
         </p:txBody>
       </p:sp>
@@ -2530,38 +2510,37 @@
           <a:p>
             <a:pPr lvl="0"/>
             <a:r>
-              <a:rPr lang="ko-KR" altLang="en-US" smtClean="0"/>
+              <a:rPr lang="ko-KR" altLang="en-US"/>
               <a:t>마스터 텍스트 스타일을 편집합니다</a:t>
             </a:r>
           </a:p>
           <a:p>
             <a:pPr lvl="1"/>
             <a:r>
-              <a:rPr lang="ko-KR" altLang="en-US" smtClean="0"/>
+              <a:rPr lang="ko-KR" altLang="en-US"/>
               <a:t>둘째 수준</a:t>
             </a:r>
           </a:p>
           <a:p>
             <a:pPr lvl="2"/>
             <a:r>
-              <a:rPr lang="ko-KR" altLang="en-US" smtClean="0"/>
+              <a:rPr lang="ko-KR" altLang="en-US"/>
               <a:t>셋째 수준</a:t>
             </a:r>
           </a:p>
           <a:p>
             <a:pPr lvl="3"/>
             <a:r>
-              <a:rPr lang="ko-KR" altLang="en-US" smtClean="0"/>
+              <a:rPr lang="ko-KR" altLang="en-US"/>
               <a:t>넷째 수준</a:t>
             </a:r>
           </a:p>
           <a:p>
             <a:pPr lvl="4"/>
             <a:r>
-              <a:rPr lang="ko-KR" altLang="en-US" smtClean="0"/>
+              <a:rPr lang="ko-KR" altLang="en-US"/>
               <a:t>다섯째 수준</a:t>
             </a:r>
-            <a:endParaRPr lang="ko-KR" altLang="en-US"/>
           </a:p>
         </p:txBody>
       </p:sp>
@@ -2601,7 +2580,7 @@
             <a:fld id="{E0C64F5E-737F-4F6B-9F15-DAA8DB3BF429}" type="datetimeFigureOut">
               <a:rPr lang="ko-KR" altLang="en-US" smtClean="0"/>
               <a:pPr/>
-              <a:t>2020-02-28</a:t>
+              <a:t>2020-02-29</a:t>
             </a:fld>
             <a:endParaRPr lang="ko-KR" altLang="en-US"/>
           </a:p>
@@ -3023,7 +3002,7 @@
           <a:lstStyle/>
           <a:p>
             <a:r>
-              <a:rPr lang="en-US" altLang="ko-KR" dirty="0" smtClean="0"/>
+              <a:rPr lang="en-US" altLang="ko-KR" dirty="0"/>
               <a:t>EZEN CROWD FUNDING</a:t>
             </a:r>
             <a:endParaRPr lang="ko-KR" altLang="en-US" dirty="0"/>
@@ -3046,10 +3025,9 @@
           <a:lstStyle/>
           <a:p>
             <a:r>
-              <a:rPr lang="ko-KR" altLang="en-US" dirty="0" smtClean="0"/>
+              <a:rPr lang="ko-KR" altLang="en-US" dirty="0"/>
               <a:t>기능 정리</a:t>
             </a:r>
-            <a:endParaRPr lang="ko-KR" altLang="en-US" dirty="0"/>
           </a:p>
         </p:txBody>
       </p:sp>
@@ -3099,41 +3077,370 @@
           <a:lstStyle/>
           <a:p>
             <a:r>
-              <a:rPr lang="ko-KR" altLang="en-US" dirty="0" smtClean="0"/>
+              <a:rPr lang="ko-KR" altLang="en-US" dirty="0"/>
               <a:t>사용자 기능</a:t>
             </a:r>
+          </a:p>
+        </p:txBody>
+      </p:sp>
+      <p:sp>
+        <p:nvSpPr>
+          <p:cNvPr id="3" name="내용 개체 틀 2"/>
+          <p:cNvSpPr>
+            <a:spLocks noGrp="1"/>
+          </p:cNvSpPr>
+          <p:nvPr>
+            <p:ph idx="1"/>
+          </p:nvPr>
+        </p:nvSpPr>
+        <p:spPr/>
+        <p:txBody>
+          <a:bodyPr/>
+          <a:lstStyle/>
+          <a:p>
+            <a:pPr>
+              <a:buNone/>
+            </a:pPr>
+            <a:endParaRPr lang="en-US" altLang="ko-KR" dirty="0"/>
+          </a:p>
+          <a:p>
+            <a:endParaRPr lang="en-US" altLang="ko-KR" dirty="0"/>
+          </a:p>
+          <a:p>
+            <a:endParaRPr lang="en-US" altLang="ko-KR" dirty="0"/>
+          </a:p>
+          <a:p>
+            <a:endParaRPr lang="en-US" altLang="ko-KR" dirty="0"/>
+          </a:p>
+        </p:txBody>
+      </p:sp>
+      <p:sp>
+        <p:nvSpPr>
+          <p:cNvPr id="4" name="TextBox 3">
+            <a:extLst>
+              <a:ext uri="{FF2B5EF4-FFF2-40B4-BE49-F238E27FC236}">
+                <a16:creationId xmlns:a16="http://schemas.microsoft.com/office/drawing/2014/main" id="{3C7986A1-0237-4765-8B3A-01D3FEB0EFA1}"/>
+              </a:ext>
+            </a:extLst>
+          </p:cNvPr>
+          <p:cNvSpPr txBox="1"/>
+          <p:nvPr/>
+        </p:nvSpPr>
+        <p:spPr>
+          <a:xfrm>
+            <a:off x="838200" y="1600200"/>
+            <a:ext cx="10515600" cy="4524315"/>
+          </a:xfrm>
+          <a:prstGeom prst="rect">
+            <a:avLst/>
+          </a:prstGeom>
+          <a:noFill/>
+        </p:spPr>
+        <p:txBody>
+          <a:bodyPr wrap="square" rtlCol="0">
+            <a:spAutoFit/>
+          </a:bodyPr>
+          <a:lstStyle/>
+          <a:p>
+            <a:r>
+              <a:rPr lang="ko-KR" altLang="en-US" dirty="0"/>
+              <a:t>대여자</a:t>
+            </a:r>
+            <a:r>
+              <a:rPr lang="en-US" altLang="ko-KR" dirty="0"/>
+              <a:t>(</a:t>
+            </a:r>
+            <a:r>
+              <a:rPr lang="ko-KR" altLang="en-US" dirty="0"/>
+              <a:t>대여 해주는 사람</a:t>
+            </a:r>
+            <a:r>
+              <a:rPr lang="en-US" altLang="ko-KR" dirty="0"/>
+              <a:t>): </a:t>
+            </a:r>
+            <a:r>
+              <a:rPr lang="ko-KR" altLang="en-US" dirty="0"/>
+              <a:t>상품 등록</a:t>
+            </a:r>
+            <a:r>
+              <a:rPr lang="en-US" altLang="ko-KR" dirty="0"/>
+              <a:t>, </a:t>
+            </a:r>
+            <a:r>
+              <a:rPr lang="ko-KR" altLang="en-US" dirty="0"/>
+              <a:t>옵션 등록</a:t>
+            </a:r>
+            <a:r>
+              <a:rPr lang="en-US" altLang="ko-KR" dirty="0"/>
+              <a:t>(12h, 24h </a:t>
+            </a:r>
+            <a:r>
+              <a:rPr lang="ko-KR" altLang="en-US" dirty="0"/>
+              <a:t>단위로</a:t>
+            </a:r>
+            <a:r>
+              <a:rPr lang="en-US" altLang="ko-KR" dirty="0"/>
+              <a:t>, ~7</a:t>
+            </a:r>
+            <a:r>
+              <a:rPr lang="ko-KR" altLang="en-US" dirty="0"/>
+              <a:t>일까지</a:t>
+            </a:r>
+            <a:r>
+              <a:rPr lang="en-US" altLang="ko-KR" dirty="0"/>
+              <a:t>)</a:t>
+            </a:r>
+          </a:p>
+          <a:p>
+            <a:r>
+              <a:rPr lang="en-US" altLang="ko-KR" dirty="0"/>
+              <a:t>			</a:t>
+            </a:r>
+            <a:r>
+              <a:rPr lang="ko-KR" altLang="en-US" dirty="0"/>
+              <a:t>상품 등록 시 상품의 상태 사진을 자세히 올려야 함</a:t>
+            </a:r>
+            <a:r>
+              <a:rPr lang="en-US" altLang="ko-KR" dirty="0"/>
+              <a:t>..</a:t>
+            </a:r>
+          </a:p>
+          <a:p>
+            <a:endParaRPr lang="en-US" altLang="ko-KR" dirty="0"/>
+          </a:p>
+          <a:p>
+            <a:r>
+              <a:rPr lang="en-US" altLang="ko-KR" dirty="0"/>
+              <a:t>			</a:t>
+            </a:r>
+            <a:r>
+              <a:rPr lang="ko-KR" altLang="en-US" dirty="0"/>
+              <a:t>상품상태는</a:t>
+            </a:r>
+            <a:r>
+              <a:rPr lang="en-US" altLang="ko-KR" dirty="0"/>
+              <a:t> [</a:t>
+            </a:r>
+            <a:r>
+              <a:rPr lang="ko-KR" altLang="en-US" dirty="0"/>
+              <a:t>대여가능</a:t>
+            </a:r>
+            <a:r>
+              <a:rPr lang="en-US" altLang="ko-KR" dirty="0"/>
+              <a:t>, </a:t>
+            </a:r>
+            <a:r>
+              <a:rPr lang="ko-KR" altLang="en-US" dirty="0"/>
+              <a:t>결제 중</a:t>
+            </a:r>
+            <a:r>
+              <a:rPr lang="en-US" altLang="ko-KR" dirty="0"/>
+              <a:t>, </a:t>
+            </a:r>
+            <a:r>
+              <a:rPr lang="ko-KR" altLang="en-US" dirty="0"/>
+              <a:t>배송 중</a:t>
+            </a:r>
+            <a:r>
+              <a:rPr lang="en-US" altLang="ko-KR" dirty="0"/>
+              <a:t>, </a:t>
+            </a:r>
+            <a:r>
+              <a:rPr lang="ko-KR" altLang="en-US" dirty="0"/>
+              <a:t>대여 중</a:t>
+            </a:r>
+            <a:r>
+              <a:rPr lang="en-US" altLang="ko-KR" dirty="0"/>
+              <a:t>]</a:t>
+            </a:r>
+            <a:r>
+              <a:rPr lang="ko-KR" altLang="en-US" dirty="0"/>
+              <a:t>으로 총 </a:t>
+            </a:r>
+            <a:r>
+              <a:rPr lang="en-US" altLang="ko-KR" dirty="0"/>
+              <a:t>4</a:t>
+            </a:r>
+            <a:r>
+              <a:rPr lang="ko-KR" altLang="en-US" dirty="0"/>
+              <a:t>가지</a:t>
+            </a:r>
+            <a:endParaRPr lang="en-US" altLang="ko-KR" dirty="0"/>
+          </a:p>
+          <a:p>
+            <a:r>
+              <a:rPr lang="en-US" altLang="ko-KR" dirty="0"/>
+              <a:t>			</a:t>
+            </a:r>
+            <a:r>
+              <a:rPr lang="ko-KR" altLang="en-US" dirty="0"/>
+              <a:t>상품 대여가 결제됐다면</a:t>
+            </a:r>
+            <a:r>
+              <a:rPr lang="en-US" altLang="ko-KR" dirty="0"/>
+              <a:t>, </a:t>
+            </a:r>
+            <a:r>
+              <a:rPr lang="ko-KR" altLang="en-US" dirty="0"/>
+              <a:t>상품의 상태가 결제 중으로 바뀜</a:t>
+            </a:r>
+            <a:r>
+              <a:rPr lang="en-US" altLang="ko-KR" dirty="0"/>
+              <a:t>,</a:t>
+            </a:r>
+          </a:p>
+          <a:p>
+            <a:r>
+              <a:rPr lang="en-US" altLang="ko-KR" dirty="0"/>
+              <a:t>			</a:t>
+            </a:r>
+            <a:r>
+              <a:rPr lang="ko-KR" altLang="en-US" dirty="0"/>
+              <a:t>대여자는 결제된 내용을 확인하고 상품을 배송 후 발송 버튼을 누름</a:t>
+            </a:r>
+            <a:endParaRPr lang="en-US" altLang="ko-KR" dirty="0"/>
+          </a:p>
+          <a:p>
+            <a:r>
+              <a:rPr lang="en-US" altLang="ko-KR" dirty="0"/>
+              <a:t>			</a:t>
+            </a:r>
+            <a:r>
+              <a:rPr lang="ko-KR" altLang="en-US" dirty="0"/>
+              <a:t>상품의 상태가 배송 중으로 바뀜</a:t>
+            </a:r>
+            <a:r>
+              <a:rPr lang="en-US" altLang="ko-KR" dirty="0"/>
+              <a:t>.</a:t>
+            </a:r>
+          </a:p>
+          <a:p>
+            <a:r>
+              <a:rPr lang="en-US" altLang="ko-KR" dirty="0"/>
+              <a:t>			</a:t>
+            </a:r>
+            <a:r>
+              <a:rPr lang="ko-KR" altLang="en-US" dirty="0"/>
+              <a:t>사용자가 반납한 상품이 도착하고 대여자는 상품을 확인한 후</a:t>
+            </a:r>
+            <a:r>
+              <a:rPr lang="en-US" altLang="ko-KR" dirty="0"/>
+              <a:t>, </a:t>
+            </a:r>
+            <a:r>
+              <a:rPr lang="ko-KR" altLang="en-US" dirty="0"/>
+              <a:t>문제가 </a:t>
+            </a:r>
+            <a:r>
+              <a:rPr lang="ko-KR" altLang="en-US" dirty="0" err="1"/>
+              <a:t>없</a:t>
+            </a:r>
+            <a:r>
+              <a:rPr lang="en-US" altLang="ko-KR" dirty="0"/>
+              <a:t>			</a:t>
+            </a:r>
+            <a:r>
+              <a:rPr lang="ko-KR" altLang="en-US" dirty="0"/>
+              <a:t>는 경우 반납확인 버튼을 누름</a:t>
+            </a:r>
+            <a:r>
+              <a:rPr lang="en-US" altLang="ko-KR" dirty="0"/>
+              <a:t>, </a:t>
+            </a:r>
+            <a:r>
+              <a:rPr lang="ko-KR" altLang="en-US" dirty="0"/>
+              <a:t>보증금이 사용자에게 되돌아감</a:t>
+            </a:r>
+            <a:r>
+              <a:rPr lang="en-US" altLang="ko-KR" dirty="0"/>
+              <a:t>.</a:t>
+            </a:r>
+          </a:p>
+          <a:p>
+            <a:r>
+              <a:rPr lang="en-US" altLang="ko-KR" dirty="0"/>
+              <a:t>			</a:t>
+            </a:r>
+          </a:p>
+          <a:p>
+            <a:r>
+              <a:rPr lang="en-US" altLang="ko-KR" dirty="0"/>
+              <a:t>			</a:t>
+            </a:r>
+          </a:p>
+          <a:p>
+            <a:endParaRPr lang="en-US" altLang="ko-KR" dirty="0"/>
+          </a:p>
+          <a:p>
+            <a:r>
+              <a:rPr lang="ko-KR" altLang="en-US" dirty="0"/>
+              <a:t>사용자</a:t>
+            </a:r>
+            <a:r>
+              <a:rPr lang="en-US" altLang="ko-KR" dirty="0"/>
+              <a:t>: </a:t>
+            </a:r>
+            <a:r>
+              <a:rPr lang="ko-KR" altLang="en-US" dirty="0"/>
+              <a:t>상품 대여</a:t>
+            </a:r>
+            <a:r>
+              <a:rPr lang="en-US" altLang="ko-KR" dirty="0"/>
+              <a:t>(</a:t>
+            </a:r>
+            <a:r>
+              <a:rPr lang="ko-KR" altLang="en-US" dirty="0"/>
+              <a:t>보증금</a:t>
+            </a:r>
+            <a:r>
+              <a:rPr lang="en-US" altLang="ko-KR" dirty="0"/>
+              <a:t>+</a:t>
+            </a:r>
+            <a:r>
+              <a:rPr lang="ko-KR" altLang="en-US" dirty="0"/>
+              <a:t>사용금액을 결제한 후 상품 배송 받음</a:t>
+            </a:r>
+            <a:r>
+              <a:rPr lang="en-US" altLang="ko-KR" dirty="0"/>
+              <a:t>),</a:t>
+            </a:r>
+          </a:p>
+          <a:p>
+            <a:r>
+              <a:rPr lang="en-US" altLang="ko-KR" dirty="0"/>
+              <a:t>	</a:t>
+            </a:r>
+            <a:r>
+              <a:rPr lang="ko-KR" altLang="en-US" dirty="0"/>
+              <a:t>배송이 완료되면 사용자는 상품의 상태를 확인</a:t>
+            </a:r>
+            <a:r>
+              <a:rPr lang="en-US" altLang="ko-KR" dirty="0"/>
+              <a:t>, </a:t>
+            </a:r>
+            <a:r>
+              <a:rPr lang="ko-KR" altLang="en-US" dirty="0"/>
+              <a:t>상품의 상태가 대여중으로 변경</a:t>
+            </a:r>
+            <a:endParaRPr lang="en-US" altLang="ko-KR" dirty="0"/>
+          </a:p>
+          <a:p>
+            <a:r>
+              <a:rPr lang="en-US" altLang="ko-KR" dirty="0"/>
+              <a:t>	</a:t>
+            </a:r>
+            <a:r>
+              <a:rPr lang="ko-KR" altLang="en-US" dirty="0"/>
+              <a:t>사용완료 후 반납</a:t>
+            </a:r>
+            <a:endParaRPr lang="en-US" altLang="ko-KR" dirty="0"/>
+          </a:p>
+          <a:p>
+            <a:r>
+              <a:rPr lang="en-US" altLang="ko-KR" dirty="0"/>
+              <a:t>	</a:t>
+            </a:r>
             <a:endParaRPr lang="ko-KR" altLang="en-US" dirty="0"/>
-          </a:p>
-        </p:txBody>
-      </p:sp>
-      <p:sp>
-        <p:nvSpPr>
-          <p:cNvPr id="3" name="내용 개체 틀 2"/>
-          <p:cNvSpPr>
-            <a:spLocks noGrp="1"/>
-          </p:cNvSpPr>
-          <p:nvPr>
-            <p:ph idx="1"/>
-          </p:nvPr>
-        </p:nvSpPr>
-        <p:spPr/>
-        <p:txBody>
-          <a:bodyPr/>
-          <a:lstStyle/>
-          <a:p>
-            <a:pPr>
-              <a:buNone/>
-            </a:pPr>
-            <a:endParaRPr lang="en-US" altLang="ko-KR" dirty="0" smtClean="0"/>
-          </a:p>
-          <a:p>
-            <a:endParaRPr lang="en-US" altLang="ko-KR" dirty="0" smtClean="0"/>
-          </a:p>
-          <a:p>
-            <a:endParaRPr lang="en-US" altLang="ko-KR" dirty="0" smtClean="0"/>
-          </a:p>
-          <a:p>
-            <a:endParaRPr lang="en-US" altLang="ko-KR" dirty="0" smtClean="0"/>
           </a:p>
         </p:txBody>
       </p:sp>
@@ -3183,28 +3490,86 @@
           <a:lstStyle/>
           <a:p>
             <a:r>
-              <a:rPr lang="ko-KR" altLang="en-US" dirty="0" smtClean="0"/>
+              <a:rPr lang="ko-KR" altLang="en-US" dirty="0"/>
               <a:t>관리자 기능</a:t>
             </a:r>
-            <a:endParaRPr lang="ko-KR" altLang="en-US" dirty="0"/>
-          </a:p>
-        </p:txBody>
-      </p:sp>
-      <p:sp>
-        <p:nvSpPr>
-          <p:cNvPr id="3" name="내용 개체 틀 2"/>
-          <p:cNvSpPr>
-            <a:spLocks noGrp="1"/>
-          </p:cNvSpPr>
-          <p:nvPr>
-            <p:ph idx="1"/>
-          </p:nvPr>
-        </p:nvSpPr>
-        <p:spPr/>
-        <p:txBody>
-          <a:bodyPr/>
-          <a:lstStyle/>
-          <a:p>
+          </a:p>
+        </p:txBody>
+      </p:sp>
+      <p:sp>
+        <p:nvSpPr>
+          <p:cNvPr id="6" name="TextBox 5">
+            <a:extLst>
+              <a:ext uri="{FF2B5EF4-FFF2-40B4-BE49-F238E27FC236}">
+                <a16:creationId xmlns:a16="http://schemas.microsoft.com/office/drawing/2014/main" id="{AD63E266-E0F6-4A86-840A-6BD0D6ED1771}"/>
+              </a:ext>
+            </a:extLst>
+          </p:cNvPr>
+          <p:cNvSpPr txBox="1"/>
+          <p:nvPr/>
+        </p:nvSpPr>
+        <p:spPr>
+          <a:xfrm>
+            <a:off x="838200" y="1600200"/>
+            <a:ext cx="10515600" cy="646331"/>
+          </a:xfrm>
+          <a:prstGeom prst="rect">
+            <a:avLst/>
+          </a:prstGeom>
+          <a:noFill/>
+        </p:spPr>
+        <p:txBody>
+          <a:bodyPr wrap="square" rtlCol="0">
+            <a:spAutoFit/>
+          </a:bodyPr>
+          <a:lstStyle/>
+          <a:p>
+            <a:r>
+              <a:rPr lang="ko-KR" altLang="en-US" dirty="0"/>
+              <a:t>공지사항 관리</a:t>
+            </a:r>
+            <a:r>
+              <a:rPr lang="en-US" altLang="ko-KR" dirty="0"/>
+              <a:t>, FAQ </a:t>
+            </a:r>
+            <a:r>
+              <a:rPr lang="ko-KR" altLang="en-US" dirty="0"/>
+              <a:t>관리</a:t>
+            </a:r>
+            <a:r>
+              <a:rPr lang="en-US" altLang="ko-KR" dirty="0"/>
+              <a:t>, </a:t>
+            </a:r>
+            <a:r>
+              <a:rPr lang="ko-KR" altLang="en-US" dirty="0"/>
+              <a:t>상품 카테고리 관리</a:t>
+            </a:r>
+            <a:r>
+              <a:rPr lang="en-US" altLang="ko-KR" dirty="0"/>
+              <a:t>, </a:t>
+            </a:r>
+            <a:r>
+              <a:rPr lang="ko-KR" altLang="en-US" dirty="0"/>
+              <a:t>회원정보 관리</a:t>
+            </a:r>
+            <a:r>
+              <a:rPr lang="en-US" altLang="ko-KR" dirty="0"/>
+              <a:t>, Q&amp;A </a:t>
+            </a:r>
+            <a:r>
+              <a:rPr lang="ko-KR" altLang="en-US" dirty="0"/>
+              <a:t>답변</a:t>
+            </a:r>
+            <a:r>
+              <a:rPr lang="en-US" altLang="ko-KR" dirty="0"/>
+              <a:t>,</a:t>
+            </a:r>
+          </a:p>
+          <a:p>
+            <a:r>
+              <a:rPr lang="ko-KR" altLang="en-US"/>
+              <a:t>상품 관리</a:t>
+            </a:r>
             <a:endParaRPr lang="ko-KR" altLang="en-US" dirty="0"/>
           </a:p>
         </p:txBody>
@@ -3255,25 +3620,24 @@
           <a:lstStyle/>
           <a:p>
             <a:r>
-              <a:rPr lang="ko-KR" altLang="en-US" dirty="0" smtClean="0"/>
+              <a:rPr lang="ko-KR" altLang="en-US" dirty="0"/>
               <a:t>기타 아무거나 넣고 싶은 기능</a:t>
             </a:r>
             <a:r>
-              <a:rPr lang="en-US" altLang="ko-KR" dirty="0" smtClean="0"/>
+              <a:rPr lang="en-US" altLang="ko-KR" dirty="0"/>
               <a:t>???</a:t>
             </a:r>
             <a:br>
-              <a:rPr lang="en-US" altLang="ko-KR" dirty="0" smtClean="0"/>
+              <a:rPr lang="en-US" altLang="ko-KR" dirty="0"/>
             </a:br>
             <a:r>
-              <a:rPr lang="ko-KR" altLang="en-US" dirty="0" err="1" smtClean="0"/>
+              <a:rPr lang="ko-KR" altLang="en-US" dirty="0" err="1"/>
               <a:t>기브미</a:t>
             </a:r>
             <a:r>
-              <a:rPr lang="ko-KR" altLang="en-US" dirty="0" smtClean="0"/>
+              <a:rPr lang="ko-KR" altLang="en-US" dirty="0"/>
               <a:t> 아이디어</a:t>
             </a:r>
-            <a:endParaRPr lang="ko-KR" altLang="en-US" dirty="0"/>
           </a:p>
         </p:txBody>
       </p:sp>
@@ -3564,7 +3928,7 @@
   <a:extraClrSchemeLst/>
   <a:extLst>
     <a:ext uri="{05A4C25C-085E-4340-85A3-A5531E510DB2}">
-      <thm15:themeFamily xmlns:thm15="http://schemas.microsoft.com/office/thememl/2012/main" xmlns="" name="Office Theme" id="{62F939B6-93AF-4DB8-9C6B-D6C7DFDC589F}" vid="{4A3C46E8-61CC-4603-A589-7422A47A8E4A}"/>
+      <thm15:themeFamily xmlns:thm15="http://schemas.microsoft.com/office/thememl/2012/main" name="Office Theme" id="{62F939B6-93AF-4DB8-9C6B-D6C7DFDC589F}" vid="{4A3C46E8-61CC-4603-A589-7422A47A8E4A}"/>
     </a:ext>
   </a:extLst>
 </a:theme>

</xml_diff>